<commit_message>
ISS-48: Add processing slide number placeholders
</commit_message>
<xml_diff>
--- a/src/SlideDotNet.Tests/Resource/019.pptx
+++ b/src/SlideDotNet.Tests/Resource/019.pptx
@@ -1130,7 +1130,7 @@
               <a:pPr>
                 <a:defRPr/>
               </a:pPr>
-              <a:t>21.02.2020</a:t>
+              <a:t>26.02.2020</a:t>
             </a:fld>
             <a:endParaRPr lang="ru-RU"/>
           </a:p>
@@ -2056,12 +2056,9 @@
             <a:pPr>
               <a:defRPr/>
             </a:pPr>
-            <a:fld id="{3DC566F9-3BD4-4061-A2C0-5F2E9294DECC}" type="datetimeFigureOut">
-              <a:rPr lang="ru-RU"/>
-              <a:pPr>
-                <a:defRPr/>
-              </a:pPr>
-              <a:t>21.02.2020</a:t>
+            <a:fld id="{A27C6C47-F513-4D05-B98E-F3D5B37328A0}" type="datetime1">
+              <a:rPr lang="ru-RU" smtClean="0"/>
+              <a:t>26.02.2020</a:t>
             </a:fld>
             <a:endParaRPr lang="ru-RU"/>
           </a:p>
@@ -2419,12 +2416,9 @@
             <a:pPr>
               <a:defRPr/>
             </a:pPr>
-            <a:fld id="{6E900621-F651-4F62-B963-B7CD5C6081A3}" type="datetimeFigureOut">
-              <a:rPr lang="ru-RU"/>
-              <a:pPr>
-                <a:defRPr/>
-              </a:pPr>
-              <a:t>21.02.2020</a:t>
+            <a:fld id="{D682EB45-AA6E-47D4-81C6-B0F5BB9DBA22}" type="datetime1">
+              <a:rPr lang="ru-RU" smtClean="0"/>
+              <a:t>26.02.2020</a:t>
             </a:fld>
             <a:endParaRPr lang="ru-RU"/>
           </a:p>
@@ -2529,6 +2523,7 @@
     <p:sldLayoutId id="2147483649" r:id="rId1"/>
     <p:sldLayoutId id="2147483650" r:id="rId2"/>
   </p:sldLayoutIdLst>
+  <p:hf hdr="0" ftr="0" dt="0"/>
   <p:txStyles>
     <p:titleStyle>
       <a:lvl1pPr algn="ctr" rtl="0" eaLnBrk="0" fontAlgn="base" hangingPunct="0">
@@ -3037,6 +3032,36 @@
           </a:graphicData>
         </a:graphic>
       </p:graphicFrame>
+      <p:sp>
+        <p:nvSpPr>
+          <p:cNvPr id="2" name="Номер слайда 1">
+            <a:extLst>
+              <a:ext uri="{FF2B5EF4-FFF2-40B4-BE49-F238E27FC236}">
+                <a16:creationId xmlns:a16="http://schemas.microsoft.com/office/drawing/2014/main" id="{A8E9DBEB-C824-44F8-A441-8D5639F5D2EE}"/>
+              </a:ext>
+            </a:extLst>
+          </p:cNvPr>
+          <p:cNvSpPr>
+            <a:spLocks noGrp="1"/>
+          </p:cNvSpPr>
+          <p:nvPr>
+            <p:ph type="sldNum" sz="quarter" idx="12"/>
+          </p:nvPr>
+        </p:nvSpPr>
+        <p:spPr/>
+        <p:txBody>
+          <a:bodyPr/>
+          <a:lstStyle/>
+          <a:p>
+            <a:fld id="{CA9B0150-FB99-47B7-A11E-F1EE412D2BBE}" type="slidenum">
+              <a:rPr lang="ru-RU" smtClean="0"/>
+              <a:pPr/>
+              <a:t>1</a:t>
+            </a:fld>
+            <a:endParaRPr lang="ru-RU"/>
+          </a:p>
+        </p:txBody>
+      </p:sp>
     </p:spTree>
   </p:cSld>
   <p:clrMapOvr>

</xml_diff>